<commit_message>
Updated game and powerpoint
</commit_message>
<xml_diff>
--- a/Presentations/Presentation 3/Group 3 Pitch 3.pptx
+++ b/Presentations/Presentation 3/Group 3 Pitch 3.pptx
@@ -5,7 +5,7 @@
     <p:sldMasterId id="2147483923" r:id="rId1"/>
   </p:sldMasterIdLst>
   <p:notesMasterIdLst>
-    <p:notesMasterId r:id="rId9"/>
+    <p:notesMasterId r:id="rId15"/>
   </p:notesMasterIdLst>
   <p:sldIdLst>
     <p:sldId id="256" r:id="rId2"/>
@@ -14,7 +14,13 @@
     <p:sldId id="270" r:id="rId5"/>
     <p:sldId id="271" r:id="rId6"/>
     <p:sldId id="275" r:id="rId7"/>
-    <p:sldId id="276" r:id="rId8"/>
+    <p:sldId id="281" r:id="rId8"/>
+    <p:sldId id="277" r:id="rId9"/>
+    <p:sldId id="278" r:id="rId10"/>
+    <p:sldId id="279" r:id="rId11"/>
+    <p:sldId id="280" r:id="rId12"/>
+    <p:sldId id="283" r:id="rId13"/>
+    <p:sldId id="276" r:id="rId14"/>
   </p:sldIdLst>
   <p:sldSz cx="12192000" cy="6858000"/>
   <p:notesSz cx="6858000" cy="9144000"/>
@@ -121,10 +127,6 @@
 </p:presentation>
 </file>
 
-<file path=ppt/revisionInfo.xml><?xml version="1.0" encoding="utf-8"?>
-<p1510:revInfo xmlns:a="http://schemas.openxmlformats.org/drawingml/2006/main" xmlns:r="http://schemas.openxmlformats.org/officeDocument/2006/relationships" xmlns:p1510="http://schemas.microsoft.com/office/powerpoint/2015/10/main"/>
-</file>
-
 <file path=ppt/notesMasters/notesMaster1.xml><?xml version="1.0" encoding="utf-8"?>
 <p:notesMaster xmlns:a="http://schemas.openxmlformats.org/drawingml/2006/main" xmlns:r="http://schemas.openxmlformats.org/officeDocument/2006/relationships" xmlns:p="http://schemas.openxmlformats.org/presentationml/2006/main">
   <p:cSld>
@@ -207,7 +209,7 @@
           <a:p>
             <a:fld id="{BD8A97F7-914E-4F8F-BC3E-0F818B8C2EDD}" type="datetimeFigureOut">
               <a:rPr lang="en-GB" smtClean="0"/>
-              <a:t>17.4.18</a:t>
+              <a:t>18/04/2018</a:t>
             </a:fld>
             <a:endParaRPr lang="en-GB"/>
           </a:p>
@@ -565,6 +567,180 @@
 </p:notes>
 </file>
 
+<file path=ppt/notesSlides/notesSlide10.xml><?xml version="1.0" encoding="utf-8"?>
+<p:notes xmlns:a="http://schemas.openxmlformats.org/drawingml/2006/main" xmlns:r="http://schemas.openxmlformats.org/officeDocument/2006/relationships" xmlns:p="http://schemas.openxmlformats.org/presentationml/2006/main">
+  <p:cSld>
+    <p:spTree>
+      <p:nvGrpSpPr>
+        <p:cNvPr id="1" name=""/>
+        <p:cNvGrpSpPr/>
+        <p:nvPr/>
+      </p:nvGrpSpPr>
+      <p:grpSpPr>
+        <a:xfrm>
+          <a:off x="0" y="0"/>
+          <a:ext cx="0" cy="0"/>
+          <a:chOff x="0" y="0"/>
+          <a:chExt cx="0" cy="0"/>
+        </a:xfrm>
+      </p:grpSpPr>
+      <p:sp>
+        <p:nvSpPr>
+          <p:cNvPr id="2" name="Slide Image Placeholder 1"/>
+          <p:cNvSpPr>
+            <a:spLocks noGrp="1" noRot="1" noChangeAspect="1"/>
+          </p:cNvSpPr>
+          <p:nvPr>
+            <p:ph type="sldImg"/>
+          </p:nvPr>
+        </p:nvSpPr>
+        <p:spPr/>
+      </p:sp>
+      <p:sp>
+        <p:nvSpPr>
+          <p:cNvPr id="3" name="Notes Placeholder 2"/>
+          <p:cNvSpPr>
+            <a:spLocks noGrp="1"/>
+          </p:cNvSpPr>
+          <p:nvPr>
+            <p:ph type="body" idx="1"/>
+          </p:nvPr>
+        </p:nvSpPr>
+        <p:spPr/>
+        <p:txBody>
+          <a:bodyPr/>
+          <a:lstStyle/>
+          <a:p>
+            <a:r>
+              <a:rPr lang="en-GB" dirty="0"/>
+              <a:t>Feedback from play testers, what to add, what to take away </a:t>
+            </a:r>
+          </a:p>
+        </p:txBody>
+      </p:sp>
+      <p:sp>
+        <p:nvSpPr>
+          <p:cNvPr id="4" name="Slide Number Placeholder 3"/>
+          <p:cNvSpPr>
+            <a:spLocks noGrp="1"/>
+          </p:cNvSpPr>
+          <p:nvPr>
+            <p:ph type="sldNum" sz="quarter" idx="10"/>
+          </p:nvPr>
+        </p:nvSpPr>
+        <p:spPr/>
+        <p:txBody>
+          <a:bodyPr/>
+          <a:lstStyle/>
+          <a:p>
+            <a:fld id="{72C98841-F3AA-46B8-8041-B1851ECCCE97}" type="slidenum">
+              <a:rPr lang="en-GB" smtClean="0"/>
+              <a:t>11</a:t>
+            </a:fld>
+            <a:endParaRPr lang="en-GB"/>
+          </a:p>
+        </p:txBody>
+      </p:sp>
+    </p:spTree>
+    <p:extLst>
+      <p:ext uri="{BB962C8B-B14F-4D97-AF65-F5344CB8AC3E}">
+        <p14:creationId xmlns:p14="http://schemas.microsoft.com/office/powerpoint/2010/main" val="3842059602"/>
+      </p:ext>
+    </p:extLst>
+  </p:cSld>
+  <p:clrMapOvr>
+    <a:masterClrMapping/>
+  </p:clrMapOvr>
+</p:notes>
+</file>
+
+<file path=ppt/notesSlides/notesSlide11.xml><?xml version="1.0" encoding="utf-8"?>
+<p:notes xmlns:a="http://schemas.openxmlformats.org/drawingml/2006/main" xmlns:r="http://schemas.openxmlformats.org/officeDocument/2006/relationships" xmlns:p="http://schemas.openxmlformats.org/presentationml/2006/main">
+  <p:cSld>
+    <p:spTree>
+      <p:nvGrpSpPr>
+        <p:cNvPr id="1" name=""/>
+        <p:cNvGrpSpPr/>
+        <p:nvPr/>
+      </p:nvGrpSpPr>
+      <p:grpSpPr>
+        <a:xfrm>
+          <a:off x="0" y="0"/>
+          <a:ext cx="0" cy="0"/>
+          <a:chOff x="0" y="0"/>
+          <a:chExt cx="0" cy="0"/>
+        </a:xfrm>
+      </p:grpSpPr>
+      <p:sp>
+        <p:nvSpPr>
+          <p:cNvPr id="2" name="Slide Image Placeholder 1"/>
+          <p:cNvSpPr>
+            <a:spLocks noGrp="1" noRot="1" noChangeAspect="1"/>
+          </p:cNvSpPr>
+          <p:nvPr>
+            <p:ph type="sldImg"/>
+          </p:nvPr>
+        </p:nvSpPr>
+        <p:spPr/>
+      </p:sp>
+      <p:sp>
+        <p:nvSpPr>
+          <p:cNvPr id="3" name="Notes Placeholder 2"/>
+          <p:cNvSpPr>
+            <a:spLocks noGrp="1"/>
+          </p:cNvSpPr>
+          <p:nvPr>
+            <p:ph type="body" idx="1"/>
+          </p:nvPr>
+        </p:nvSpPr>
+        <p:spPr/>
+        <p:txBody>
+          <a:bodyPr/>
+          <a:lstStyle/>
+          <a:p>
+            <a:r>
+              <a:rPr lang="en-GB" dirty="0"/>
+              <a:t>Feedback from play testers, what to add, what to take away </a:t>
+            </a:r>
+          </a:p>
+        </p:txBody>
+      </p:sp>
+      <p:sp>
+        <p:nvSpPr>
+          <p:cNvPr id="4" name="Slide Number Placeholder 3"/>
+          <p:cNvSpPr>
+            <a:spLocks noGrp="1"/>
+          </p:cNvSpPr>
+          <p:nvPr>
+            <p:ph type="sldNum" sz="quarter" idx="10"/>
+          </p:nvPr>
+        </p:nvSpPr>
+        <p:spPr/>
+        <p:txBody>
+          <a:bodyPr/>
+          <a:lstStyle/>
+          <a:p>
+            <a:fld id="{72C98841-F3AA-46B8-8041-B1851ECCCE97}" type="slidenum">
+              <a:rPr lang="en-GB" smtClean="0"/>
+              <a:t>12</a:t>
+            </a:fld>
+            <a:endParaRPr lang="en-GB"/>
+          </a:p>
+        </p:txBody>
+      </p:sp>
+    </p:spTree>
+    <p:extLst>
+      <p:ext uri="{BB962C8B-B14F-4D97-AF65-F5344CB8AC3E}">
+        <p14:creationId xmlns:p14="http://schemas.microsoft.com/office/powerpoint/2010/main" val="3451202492"/>
+      </p:ext>
+    </p:extLst>
+  </p:cSld>
+  <p:clrMapOvr>
+    <a:masterClrMapping/>
+  </p:clrMapOvr>
+</p:notes>
+</file>
+
 <file path=ppt/notesSlides/notesSlide2.xml><?xml version="1.0" encoding="utf-8"?>
 <p:notes xmlns:a="http://schemas.openxmlformats.org/drawingml/2006/main" xmlns:r="http://schemas.openxmlformats.org/officeDocument/2006/relationships" xmlns:p="http://schemas.openxmlformats.org/presentationml/2006/main">
   <p:cSld>
@@ -904,6 +1080,354 @@
     <p:extLst>
       <p:ext uri="{BB962C8B-B14F-4D97-AF65-F5344CB8AC3E}">
         <p14:creationId xmlns:p14="http://schemas.microsoft.com/office/powerpoint/2010/main" val="3946076619"/>
+      </p:ext>
+    </p:extLst>
+  </p:cSld>
+  <p:clrMapOvr>
+    <a:masterClrMapping/>
+  </p:clrMapOvr>
+</p:notes>
+</file>
+
+<file path=ppt/notesSlides/notesSlide6.xml><?xml version="1.0" encoding="utf-8"?>
+<p:notes xmlns:a="http://schemas.openxmlformats.org/drawingml/2006/main" xmlns:r="http://schemas.openxmlformats.org/officeDocument/2006/relationships" xmlns:p="http://schemas.openxmlformats.org/presentationml/2006/main">
+  <p:cSld>
+    <p:spTree>
+      <p:nvGrpSpPr>
+        <p:cNvPr id="1" name=""/>
+        <p:cNvGrpSpPr/>
+        <p:nvPr/>
+      </p:nvGrpSpPr>
+      <p:grpSpPr>
+        <a:xfrm>
+          <a:off x="0" y="0"/>
+          <a:ext cx="0" cy="0"/>
+          <a:chOff x="0" y="0"/>
+          <a:chExt cx="0" cy="0"/>
+        </a:xfrm>
+      </p:grpSpPr>
+      <p:sp>
+        <p:nvSpPr>
+          <p:cNvPr id="2" name="Slide Image Placeholder 1"/>
+          <p:cNvSpPr>
+            <a:spLocks noGrp="1" noRot="1" noChangeAspect="1"/>
+          </p:cNvSpPr>
+          <p:nvPr>
+            <p:ph type="sldImg"/>
+          </p:nvPr>
+        </p:nvSpPr>
+        <p:spPr/>
+      </p:sp>
+      <p:sp>
+        <p:nvSpPr>
+          <p:cNvPr id="3" name="Notes Placeholder 2"/>
+          <p:cNvSpPr>
+            <a:spLocks noGrp="1"/>
+          </p:cNvSpPr>
+          <p:nvPr>
+            <p:ph type="body" idx="1"/>
+          </p:nvPr>
+        </p:nvSpPr>
+        <p:spPr/>
+        <p:txBody>
+          <a:bodyPr/>
+          <a:lstStyle/>
+          <a:p>
+            <a:r>
+              <a:rPr lang="en-GB" dirty="0"/>
+              <a:t>Feedback from play testers, what to add, what to take away </a:t>
+            </a:r>
+          </a:p>
+        </p:txBody>
+      </p:sp>
+      <p:sp>
+        <p:nvSpPr>
+          <p:cNvPr id="4" name="Slide Number Placeholder 3"/>
+          <p:cNvSpPr>
+            <a:spLocks noGrp="1"/>
+          </p:cNvSpPr>
+          <p:nvPr>
+            <p:ph type="sldNum" sz="quarter" idx="10"/>
+          </p:nvPr>
+        </p:nvSpPr>
+        <p:spPr/>
+        <p:txBody>
+          <a:bodyPr/>
+          <a:lstStyle/>
+          <a:p>
+            <a:fld id="{72C98841-F3AA-46B8-8041-B1851ECCCE97}" type="slidenum">
+              <a:rPr lang="en-GB" smtClean="0"/>
+              <a:t>7</a:t>
+            </a:fld>
+            <a:endParaRPr lang="en-GB"/>
+          </a:p>
+        </p:txBody>
+      </p:sp>
+    </p:spTree>
+    <p:extLst>
+      <p:ext uri="{BB962C8B-B14F-4D97-AF65-F5344CB8AC3E}">
+        <p14:creationId xmlns:p14="http://schemas.microsoft.com/office/powerpoint/2010/main" val="2730799233"/>
+      </p:ext>
+    </p:extLst>
+  </p:cSld>
+  <p:clrMapOvr>
+    <a:masterClrMapping/>
+  </p:clrMapOvr>
+</p:notes>
+</file>
+
+<file path=ppt/notesSlides/notesSlide7.xml><?xml version="1.0" encoding="utf-8"?>
+<p:notes xmlns:a="http://schemas.openxmlformats.org/drawingml/2006/main" xmlns:r="http://schemas.openxmlformats.org/officeDocument/2006/relationships" xmlns:p="http://schemas.openxmlformats.org/presentationml/2006/main">
+  <p:cSld>
+    <p:spTree>
+      <p:nvGrpSpPr>
+        <p:cNvPr id="1" name=""/>
+        <p:cNvGrpSpPr/>
+        <p:nvPr/>
+      </p:nvGrpSpPr>
+      <p:grpSpPr>
+        <a:xfrm>
+          <a:off x="0" y="0"/>
+          <a:ext cx="0" cy="0"/>
+          <a:chOff x="0" y="0"/>
+          <a:chExt cx="0" cy="0"/>
+        </a:xfrm>
+      </p:grpSpPr>
+      <p:sp>
+        <p:nvSpPr>
+          <p:cNvPr id="2" name="Slide Image Placeholder 1"/>
+          <p:cNvSpPr>
+            <a:spLocks noGrp="1" noRot="1" noChangeAspect="1"/>
+          </p:cNvSpPr>
+          <p:nvPr>
+            <p:ph type="sldImg"/>
+          </p:nvPr>
+        </p:nvSpPr>
+        <p:spPr/>
+      </p:sp>
+      <p:sp>
+        <p:nvSpPr>
+          <p:cNvPr id="3" name="Notes Placeholder 2"/>
+          <p:cNvSpPr>
+            <a:spLocks noGrp="1"/>
+          </p:cNvSpPr>
+          <p:nvPr>
+            <p:ph type="body" idx="1"/>
+          </p:nvPr>
+        </p:nvSpPr>
+        <p:spPr/>
+        <p:txBody>
+          <a:bodyPr/>
+          <a:lstStyle/>
+          <a:p>
+            <a:r>
+              <a:rPr lang="en-GB" dirty="0"/>
+              <a:t>Feedback from play testers, what to add, what to take away </a:t>
+            </a:r>
+          </a:p>
+        </p:txBody>
+      </p:sp>
+      <p:sp>
+        <p:nvSpPr>
+          <p:cNvPr id="4" name="Slide Number Placeholder 3"/>
+          <p:cNvSpPr>
+            <a:spLocks noGrp="1"/>
+          </p:cNvSpPr>
+          <p:nvPr>
+            <p:ph type="sldNum" sz="quarter" idx="10"/>
+          </p:nvPr>
+        </p:nvSpPr>
+        <p:spPr/>
+        <p:txBody>
+          <a:bodyPr/>
+          <a:lstStyle/>
+          <a:p>
+            <a:fld id="{72C98841-F3AA-46B8-8041-B1851ECCCE97}" type="slidenum">
+              <a:rPr lang="en-GB" smtClean="0"/>
+              <a:t>8</a:t>
+            </a:fld>
+            <a:endParaRPr lang="en-GB"/>
+          </a:p>
+        </p:txBody>
+      </p:sp>
+    </p:spTree>
+    <p:extLst>
+      <p:ext uri="{BB962C8B-B14F-4D97-AF65-F5344CB8AC3E}">
+        <p14:creationId xmlns:p14="http://schemas.microsoft.com/office/powerpoint/2010/main" val="4203883975"/>
+      </p:ext>
+    </p:extLst>
+  </p:cSld>
+  <p:clrMapOvr>
+    <a:masterClrMapping/>
+  </p:clrMapOvr>
+</p:notes>
+</file>
+
+<file path=ppt/notesSlides/notesSlide8.xml><?xml version="1.0" encoding="utf-8"?>
+<p:notes xmlns:a="http://schemas.openxmlformats.org/drawingml/2006/main" xmlns:r="http://schemas.openxmlformats.org/officeDocument/2006/relationships" xmlns:p="http://schemas.openxmlformats.org/presentationml/2006/main">
+  <p:cSld>
+    <p:spTree>
+      <p:nvGrpSpPr>
+        <p:cNvPr id="1" name=""/>
+        <p:cNvGrpSpPr/>
+        <p:nvPr/>
+      </p:nvGrpSpPr>
+      <p:grpSpPr>
+        <a:xfrm>
+          <a:off x="0" y="0"/>
+          <a:ext cx="0" cy="0"/>
+          <a:chOff x="0" y="0"/>
+          <a:chExt cx="0" cy="0"/>
+        </a:xfrm>
+      </p:grpSpPr>
+      <p:sp>
+        <p:nvSpPr>
+          <p:cNvPr id="2" name="Slide Image Placeholder 1"/>
+          <p:cNvSpPr>
+            <a:spLocks noGrp="1" noRot="1" noChangeAspect="1"/>
+          </p:cNvSpPr>
+          <p:nvPr>
+            <p:ph type="sldImg"/>
+          </p:nvPr>
+        </p:nvSpPr>
+        <p:spPr/>
+      </p:sp>
+      <p:sp>
+        <p:nvSpPr>
+          <p:cNvPr id="3" name="Notes Placeholder 2"/>
+          <p:cNvSpPr>
+            <a:spLocks noGrp="1"/>
+          </p:cNvSpPr>
+          <p:nvPr>
+            <p:ph type="body" idx="1"/>
+          </p:nvPr>
+        </p:nvSpPr>
+        <p:spPr/>
+        <p:txBody>
+          <a:bodyPr/>
+          <a:lstStyle/>
+          <a:p>
+            <a:r>
+              <a:rPr lang="en-GB" dirty="0"/>
+              <a:t>Feedback from play testers, what to add, what to take away </a:t>
+            </a:r>
+          </a:p>
+        </p:txBody>
+      </p:sp>
+      <p:sp>
+        <p:nvSpPr>
+          <p:cNvPr id="4" name="Slide Number Placeholder 3"/>
+          <p:cNvSpPr>
+            <a:spLocks noGrp="1"/>
+          </p:cNvSpPr>
+          <p:nvPr>
+            <p:ph type="sldNum" sz="quarter" idx="10"/>
+          </p:nvPr>
+        </p:nvSpPr>
+        <p:spPr/>
+        <p:txBody>
+          <a:bodyPr/>
+          <a:lstStyle/>
+          <a:p>
+            <a:fld id="{72C98841-F3AA-46B8-8041-B1851ECCCE97}" type="slidenum">
+              <a:rPr lang="en-GB" smtClean="0"/>
+              <a:t>9</a:t>
+            </a:fld>
+            <a:endParaRPr lang="en-GB"/>
+          </a:p>
+        </p:txBody>
+      </p:sp>
+    </p:spTree>
+    <p:extLst>
+      <p:ext uri="{BB962C8B-B14F-4D97-AF65-F5344CB8AC3E}">
+        <p14:creationId xmlns:p14="http://schemas.microsoft.com/office/powerpoint/2010/main" val="802521791"/>
+      </p:ext>
+    </p:extLst>
+  </p:cSld>
+  <p:clrMapOvr>
+    <a:masterClrMapping/>
+  </p:clrMapOvr>
+</p:notes>
+</file>
+
+<file path=ppt/notesSlides/notesSlide9.xml><?xml version="1.0" encoding="utf-8"?>
+<p:notes xmlns:a="http://schemas.openxmlformats.org/drawingml/2006/main" xmlns:r="http://schemas.openxmlformats.org/officeDocument/2006/relationships" xmlns:p="http://schemas.openxmlformats.org/presentationml/2006/main">
+  <p:cSld>
+    <p:spTree>
+      <p:nvGrpSpPr>
+        <p:cNvPr id="1" name=""/>
+        <p:cNvGrpSpPr/>
+        <p:nvPr/>
+      </p:nvGrpSpPr>
+      <p:grpSpPr>
+        <a:xfrm>
+          <a:off x="0" y="0"/>
+          <a:ext cx="0" cy="0"/>
+          <a:chOff x="0" y="0"/>
+          <a:chExt cx="0" cy="0"/>
+        </a:xfrm>
+      </p:grpSpPr>
+      <p:sp>
+        <p:nvSpPr>
+          <p:cNvPr id="2" name="Slide Image Placeholder 1"/>
+          <p:cNvSpPr>
+            <a:spLocks noGrp="1" noRot="1" noChangeAspect="1"/>
+          </p:cNvSpPr>
+          <p:nvPr>
+            <p:ph type="sldImg"/>
+          </p:nvPr>
+        </p:nvSpPr>
+        <p:spPr/>
+      </p:sp>
+      <p:sp>
+        <p:nvSpPr>
+          <p:cNvPr id="3" name="Notes Placeholder 2"/>
+          <p:cNvSpPr>
+            <a:spLocks noGrp="1"/>
+          </p:cNvSpPr>
+          <p:nvPr>
+            <p:ph type="body" idx="1"/>
+          </p:nvPr>
+        </p:nvSpPr>
+        <p:spPr/>
+        <p:txBody>
+          <a:bodyPr/>
+          <a:lstStyle/>
+          <a:p>
+            <a:r>
+              <a:rPr lang="en-GB" dirty="0"/>
+              <a:t>Feedback from play testers, what to add, what to take away </a:t>
+            </a:r>
+          </a:p>
+        </p:txBody>
+      </p:sp>
+      <p:sp>
+        <p:nvSpPr>
+          <p:cNvPr id="4" name="Slide Number Placeholder 3"/>
+          <p:cNvSpPr>
+            <a:spLocks noGrp="1"/>
+          </p:cNvSpPr>
+          <p:nvPr>
+            <p:ph type="sldNum" sz="quarter" idx="10"/>
+          </p:nvPr>
+        </p:nvSpPr>
+        <p:spPr/>
+        <p:txBody>
+          <a:bodyPr/>
+          <a:lstStyle/>
+          <a:p>
+            <a:fld id="{72C98841-F3AA-46B8-8041-B1851ECCCE97}" type="slidenum">
+              <a:rPr lang="en-GB" smtClean="0"/>
+              <a:t>10</a:t>
+            </a:fld>
+            <a:endParaRPr lang="en-GB"/>
+          </a:p>
+        </p:txBody>
+      </p:sp>
+    </p:spTree>
+    <p:extLst>
+      <p:ext uri="{BB962C8B-B14F-4D97-AF65-F5344CB8AC3E}">
+        <p14:creationId xmlns:p14="http://schemas.microsoft.com/office/powerpoint/2010/main" val="4223596619"/>
       </p:ext>
     </p:extLst>
   </p:cSld>
@@ -2124,7 +2648,7 @@
           <a:p>
             <a:fld id="{6E18B52C-CA09-4098-AC7F-77707B59E0D3}" type="datetimeFigureOut">
               <a:rPr lang="en-GB" smtClean="0"/>
-              <a:t>17.4.18</a:t>
+              <a:t>18/04/2018</a:t>
             </a:fld>
             <a:endParaRPr lang="en-GB"/>
           </a:p>
@@ -2367,7 +2891,7 @@
           <a:p>
             <a:fld id="{6E18B52C-CA09-4098-AC7F-77707B59E0D3}" type="datetimeFigureOut">
               <a:rPr lang="en-GB" smtClean="0"/>
-              <a:t>17.4.18</a:t>
+              <a:t>18/04/2018</a:t>
             </a:fld>
             <a:endParaRPr lang="en-GB"/>
           </a:p>
@@ -2547,7 +3071,7 @@
           <a:p>
             <a:fld id="{6E18B52C-CA09-4098-AC7F-77707B59E0D3}" type="datetimeFigureOut">
               <a:rPr lang="en-GB" smtClean="0"/>
-              <a:t>17.4.18</a:t>
+              <a:t>18/04/2018</a:t>
             </a:fld>
             <a:endParaRPr lang="en-GB"/>
           </a:p>
@@ -2717,7 +3241,7 @@
           <a:p>
             <a:fld id="{6E18B52C-CA09-4098-AC7F-77707B59E0D3}" type="datetimeFigureOut">
               <a:rPr lang="en-GB" smtClean="0"/>
-              <a:t>17.4.18</a:t>
+              <a:t>18/04/2018</a:t>
             </a:fld>
             <a:endParaRPr lang="en-GB"/>
           </a:p>
@@ -2990,7 +3514,7 @@
           <a:p>
             <a:fld id="{6E18B52C-CA09-4098-AC7F-77707B59E0D3}" type="datetimeFigureOut">
               <a:rPr lang="en-GB" smtClean="0"/>
-              <a:t>17.4.18</a:t>
+              <a:t>18/04/2018</a:t>
             </a:fld>
             <a:endParaRPr lang="en-GB"/>
           </a:p>
@@ -4191,7 +4715,7 @@
           <a:p>
             <a:fld id="{6E18B52C-CA09-4098-AC7F-77707B59E0D3}" type="datetimeFigureOut">
               <a:rPr lang="en-GB" smtClean="0"/>
-              <a:t>17.4.18</a:t>
+              <a:t>18/04/2018</a:t>
             </a:fld>
             <a:endParaRPr lang="en-GB"/>
           </a:p>
@@ -4581,7 +5105,7 @@
           <a:p>
             <a:fld id="{6E18B52C-CA09-4098-AC7F-77707B59E0D3}" type="datetimeFigureOut">
               <a:rPr lang="en-GB" smtClean="0"/>
-              <a:t>17.4.18</a:t>
+              <a:t>18/04/2018</a:t>
             </a:fld>
             <a:endParaRPr lang="en-GB"/>
           </a:p>
@@ -4704,7 +5228,7 @@
           <a:p>
             <a:fld id="{6E18B52C-CA09-4098-AC7F-77707B59E0D3}" type="datetimeFigureOut">
               <a:rPr lang="en-GB" smtClean="0"/>
-              <a:t>17.4.18</a:t>
+              <a:t>18/04/2018</a:t>
             </a:fld>
             <a:endParaRPr lang="en-GB"/>
           </a:p>
@@ -4799,7 +5323,7 @@
           <a:p>
             <a:fld id="{6E18B52C-CA09-4098-AC7F-77707B59E0D3}" type="datetimeFigureOut">
               <a:rPr lang="en-GB" smtClean="0"/>
-              <a:t>17.4.18</a:t>
+              <a:t>18/04/2018</a:t>
             </a:fld>
             <a:endParaRPr lang="en-GB"/>
           </a:p>
@@ -5567,7 +6091,7 @@
           <a:p>
             <a:fld id="{6E18B52C-CA09-4098-AC7F-77707B59E0D3}" type="datetimeFigureOut">
               <a:rPr lang="en-GB" smtClean="0"/>
-              <a:t>17.4.18</a:t>
+              <a:t>18/04/2018</a:t>
             </a:fld>
             <a:endParaRPr lang="en-GB"/>
           </a:p>
@@ -6407,7 +6931,7 @@
           <a:p>
             <a:fld id="{6E18B52C-CA09-4098-AC7F-77707B59E0D3}" type="datetimeFigureOut">
               <a:rPr lang="en-GB" smtClean="0"/>
-              <a:t>17.4.18</a:t>
+              <a:t>18/04/2018</a:t>
             </a:fld>
             <a:endParaRPr lang="en-GB"/>
           </a:p>
@@ -6634,7 +7158,7 @@
           <a:p>
             <a:fld id="{6E18B52C-CA09-4098-AC7F-77707B59E0D3}" type="datetimeFigureOut">
               <a:rPr lang="en-GB" smtClean="0"/>
-              <a:t>17.4.18</a:t>
+              <a:t>18/04/2018</a:t>
             </a:fld>
             <a:endParaRPr lang="en-GB"/>
           </a:p>
@@ -7780,6 +8304,624 @@
 </p:sld>
 </file>
 
+<file path=ppt/slides/slide10.xml><?xml version="1.0" encoding="utf-8"?>
+<p:sld xmlns:a="http://schemas.openxmlformats.org/drawingml/2006/main" xmlns:r="http://schemas.openxmlformats.org/officeDocument/2006/relationships" xmlns:p="http://schemas.openxmlformats.org/presentationml/2006/main">
+  <p:cSld>
+    <p:spTree>
+      <p:nvGrpSpPr>
+        <p:cNvPr id="1" name=""/>
+        <p:cNvGrpSpPr/>
+        <p:nvPr/>
+      </p:nvGrpSpPr>
+      <p:grpSpPr>
+        <a:xfrm>
+          <a:off x="0" y="0"/>
+          <a:ext cx="0" cy="0"/>
+          <a:chOff x="0" y="0"/>
+          <a:chExt cx="0" cy="0"/>
+        </a:xfrm>
+      </p:grpSpPr>
+      <p:sp>
+        <p:nvSpPr>
+          <p:cNvPr id="2" name="Title 1">
+            <a:extLst>
+              <a:ext uri="{FF2B5EF4-FFF2-40B4-BE49-F238E27FC236}">
+                <a16:creationId xmlns:a16="http://schemas.microsoft.com/office/drawing/2014/main" id="{AE8E65D8-2D40-4802-A039-397020ABC7CB}"/>
+              </a:ext>
+            </a:extLst>
+          </p:cNvPr>
+          <p:cNvSpPr>
+            <a:spLocks noGrp="1"/>
+          </p:cNvSpPr>
+          <p:nvPr>
+            <p:ph type="title"/>
+          </p:nvPr>
+        </p:nvSpPr>
+        <p:spPr>
+          <a:xfrm>
+            <a:off x="1251678" y="382385"/>
+            <a:ext cx="7472774" cy="1492132"/>
+          </a:xfrm>
+        </p:spPr>
+        <p:txBody>
+          <a:bodyPr>
+            <a:normAutofit/>
+          </a:bodyPr>
+          <a:lstStyle/>
+          <a:p>
+            <a:r>
+              <a:rPr lang="en-GB" dirty="0"/>
+              <a:t>Current </a:t>
+            </a:r>
+            <a:r>
+              <a:rPr lang="en-GB" dirty="0" err="1"/>
+              <a:t>FeedBack</a:t>
+            </a:r>
+            <a:endParaRPr lang="en-GB" dirty="0"/>
+          </a:p>
+        </p:txBody>
+      </p:sp>
+      <p:pic>
+        <p:nvPicPr>
+          <p:cNvPr id="8" name="Picture 7">
+            <a:extLst>
+              <a:ext uri="{FF2B5EF4-FFF2-40B4-BE49-F238E27FC236}">
+                <a16:creationId xmlns:a16="http://schemas.microsoft.com/office/drawing/2014/main" id="{97209A58-090E-434A-A100-3A1E314BED18}"/>
+              </a:ext>
+            </a:extLst>
+          </p:cNvPr>
+          <p:cNvPicPr>
+            <a:picLocks noChangeAspect="1"/>
+          </p:cNvPicPr>
+          <p:nvPr/>
+        </p:nvPicPr>
+        <p:blipFill>
+          <a:blip r:embed="rId3">
+            <a:extLst>
+              <a:ext uri="{28A0092B-C50C-407E-A947-70E740481C1C}">
+                <a14:useLocalDpi xmlns:a14="http://schemas.microsoft.com/office/drawing/2010/main" val="0"/>
+              </a:ext>
+            </a:extLst>
+          </a:blip>
+          <a:stretch>
+            <a:fillRect/>
+          </a:stretch>
+        </p:blipFill>
+        <p:spPr>
+          <a:xfrm>
+            <a:off x="10499835" y="197250"/>
+            <a:ext cx="1082563" cy="1198414"/>
+          </a:xfrm>
+          <a:prstGeom prst="rect">
+            <a:avLst/>
+          </a:prstGeom>
+        </p:spPr>
+      </p:pic>
+      <p:sp>
+        <p:nvSpPr>
+          <p:cNvPr id="9" name="TextBox 8">
+            <a:extLst>
+              <a:ext uri="{FF2B5EF4-FFF2-40B4-BE49-F238E27FC236}">
+                <a16:creationId xmlns:a16="http://schemas.microsoft.com/office/drawing/2014/main" id="{9CFFBA23-97CE-4987-AA89-6173A4CE55EE}"/>
+              </a:ext>
+            </a:extLst>
+          </p:cNvPr>
+          <p:cNvSpPr txBox="1"/>
+          <p:nvPr/>
+        </p:nvSpPr>
+        <p:spPr>
+          <a:xfrm>
+            <a:off x="1628382" y="1874517"/>
+            <a:ext cx="7644705" cy="5237716"/>
+          </a:xfrm>
+          <a:prstGeom prst="rect">
+            <a:avLst/>
+          </a:prstGeom>
+          <a:noFill/>
+        </p:spPr>
+        <p:txBody>
+          <a:bodyPr wrap="square" rtlCol="0">
+            <a:spAutoFit/>
+          </a:bodyPr>
+          <a:lstStyle/>
+          <a:p>
+            <a:r>
+              <a:rPr lang="en-GB" sz="3200" dirty="0"/>
+              <a:t>Its too easy</a:t>
+            </a:r>
+          </a:p>
+          <a:p>
+            <a:r>
+              <a:rPr lang="en-GB" sz="3000" dirty="0"/>
+              <a:t>	We added a red herring</a:t>
+            </a:r>
+          </a:p>
+          <a:p>
+            <a:endParaRPr lang="en-GB" sz="3000" dirty="0"/>
+          </a:p>
+          <a:p>
+            <a:r>
+              <a:rPr lang="en-GB" sz="3200" dirty="0"/>
+              <a:t>Player 2 can’t read the recipe</a:t>
+            </a:r>
+          </a:p>
+          <a:p>
+            <a:r>
+              <a:rPr lang="en-GB" sz="3000" dirty="0"/>
+              <a:t>	We flipped the recipe card for player 2</a:t>
+            </a:r>
+          </a:p>
+          <a:p>
+            <a:endParaRPr lang="en-GB" sz="3000" dirty="0"/>
+          </a:p>
+          <a:p>
+            <a:r>
+              <a:rPr lang="en-GB" sz="3200" dirty="0"/>
+              <a:t>It’s not clear who’s winning</a:t>
+            </a:r>
+          </a:p>
+          <a:p>
+            <a:pPr>
+              <a:lnSpc>
+                <a:spcPct val="200000"/>
+              </a:lnSpc>
+            </a:pPr>
+            <a:endParaRPr lang="en-GB" sz="3200" dirty="0"/>
+          </a:p>
+          <a:p>
+            <a:pPr>
+              <a:lnSpc>
+                <a:spcPct val="200000"/>
+              </a:lnSpc>
+            </a:pPr>
+            <a:endParaRPr lang="en-GB" sz="3200" dirty="0"/>
+          </a:p>
+        </p:txBody>
+      </p:sp>
+    </p:spTree>
+    <p:extLst>
+      <p:ext uri="{BB962C8B-B14F-4D97-AF65-F5344CB8AC3E}">
+        <p14:creationId xmlns:p14="http://schemas.microsoft.com/office/powerpoint/2010/main" val="1236302268"/>
+      </p:ext>
+    </p:extLst>
+  </p:cSld>
+  <p:clrMapOvr>
+    <a:masterClrMapping/>
+  </p:clrMapOvr>
+</p:sld>
+</file>
+
+<file path=ppt/slides/slide11.xml><?xml version="1.0" encoding="utf-8"?>
+<p:sld xmlns:a="http://schemas.openxmlformats.org/drawingml/2006/main" xmlns:r="http://schemas.openxmlformats.org/officeDocument/2006/relationships" xmlns:p="http://schemas.openxmlformats.org/presentationml/2006/main">
+  <p:cSld>
+    <p:spTree>
+      <p:nvGrpSpPr>
+        <p:cNvPr id="1" name=""/>
+        <p:cNvGrpSpPr/>
+        <p:nvPr/>
+      </p:nvGrpSpPr>
+      <p:grpSpPr>
+        <a:xfrm>
+          <a:off x="0" y="0"/>
+          <a:ext cx="0" cy="0"/>
+          <a:chOff x="0" y="0"/>
+          <a:chExt cx="0" cy="0"/>
+        </a:xfrm>
+      </p:grpSpPr>
+      <p:sp>
+        <p:nvSpPr>
+          <p:cNvPr id="2" name="Title 1">
+            <a:extLst>
+              <a:ext uri="{FF2B5EF4-FFF2-40B4-BE49-F238E27FC236}">
+                <a16:creationId xmlns:a16="http://schemas.microsoft.com/office/drawing/2014/main" id="{AE8E65D8-2D40-4802-A039-397020ABC7CB}"/>
+              </a:ext>
+            </a:extLst>
+          </p:cNvPr>
+          <p:cNvSpPr>
+            <a:spLocks noGrp="1"/>
+          </p:cNvSpPr>
+          <p:nvPr>
+            <p:ph type="title"/>
+          </p:nvPr>
+        </p:nvSpPr>
+        <p:spPr>
+          <a:xfrm>
+            <a:off x="1251678" y="382385"/>
+            <a:ext cx="7472774" cy="1492132"/>
+          </a:xfrm>
+        </p:spPr>
+        <p:txBody>
+          <a:bodyPr>
+            <a:normAutofit/>
+          </a:bodyPr>
+          <a:lstStyle/>
+          <a:p>
+            <a:r>
+              <a:rPr lang="en-GB" dirty="0"/>
+              <a:t>Current </a:t>
+            </a:r>
+            <a:r>
+              <a:rPr lang="en-GB" dirty="0" err="1"/>
+              <a:t>FeedBack</a:t>
+            </a:r>
+            <a:endParaRPr lang="en-GB" dirty="0"/>
+          </a:p>
+        </p:txBody>
+      </p:sp>
+      <p:pic>
+        <p:nvPicPr>
+          <p:cNvPr id="8" name="Picture 7">
+            <a:extLst>
+              <a:ext uri="{FF2B5EF4-FFF2-40B4-BE49-F238E27FC236}">
+                <a16:creationId xmlns:a16="http://schemas.microsoft.com/office/drawing/2014/main" id="{97209A58-090E-434A-A100-3A1E314BED18}"/>
+              </a:ext>
+            </a:extLst>
+          </p:cNvPr>
+          <p:cNvPicPr>
+            <a:picLocks noChangeAspect="1"/>
+          </p:cNvPicPr>
+          <p:nvPr/>
+        </p:nvPicPr>
+        <p:blipFill>
+          <a:blip r:embed="rId3">
+            <a:extLst>
+              <a:ext uri="{28A0092B-C50C-407E-A947-70E740481C1C}">
+                <a14:useLocalDpi xmlns:a14="http://schemas.microsoft.com/office/drawing/2010/main" val="0"/>
+              </a:ext>
+            </a:extLst>
+          </a:blip>
+          <a:stretch>
+            <a:fillRect/>
+          </a:stretch>
+        </p:blipFill>
+        <p:spPr>
+          <a:xfrm>
+            <a:off x="10499835" y="197250"/>
+            <a:ext cx="1082563" cy="1198414"/>
+          </a:xfrm>
+          <a:prstGeom prst="rect">
+            <a:avLst/>
+          </a:prstGeom>
+        </p:spPr>
+      </p:pic>
+      <p:sp>
+        <p:nvSpPr>
+          <p:cNvPr id="9" name="TextBox 8">
+            <a:extLst>
+              <a:ext uri="{FF2B5EF4-FFF2-40B4-BE49-F238E27FC236}">
+                <a16:creationId xmlns:a16="http://schemas.microsoft.com/office/drawing/2014/main" id="{9CFFBA23-97CE-4987-AA89-6173A4CE55EE}"/>
+              </a:ext>
+            </a:extLst>
+          </p:cNvPr>
+          <p:cNvSpPr txBox="1"/>
+          <p:nvPr/>
+        </p:nvSpPr>
+        <p:spPr>
+          <a:xfrm>
+            <a:off x="1628382" y="1874517"/>
+            <a:ext cx="7644705" cy="5878532"/>
+          </a:xfrm>
+          <a:prstGeom prst="rect">
+            <a:avLst/>
+          </a:prstGeom>
+          <a:noFill/>
+        </p:spPr>
+        <p:txBody>
+          <a:bodyPr wrap="square" rtlCol="0">
+            <a:spAutoFit/>
+          </a:bodyPr>
+          <a:lstStyle/>
+          <a:p>
+            <a:r>
+              <a:rPr lang="en-GB" sz="3200" dirty="0"/>
+              <a:t>Its too easy</a:t>
+            </a:r>
+          </a:p>
+          <a:p>
+            <a:r>
+              <a:rPr lang="en-GB" sz="3000" dirty="0"/>
+              <a:t>	We added a red herring</a:t>
+            </a:r>
+          </a:p>
+          <a:p>
+            <a:endParaRPr lang="en-GB" sz="3000" dirty="0"/>
+          </a:p>
+          <a:p>
+            <a:r>
+              <a:rPr lang="en-GB" sz="3200" dirty="0"/>
+              <a:t>Player 2 can’t read the recipe</a:t>
+            </a:r>
+          </a:p>
+          <a:p>
+            <a:r>
+              <a:rPr lang="en-GB" sz="3000" dirty="0"/>
+              <a:t>	We flipped the recipe card for player 2</a:t>
+            </a:r>
+          </a:p>
+          <a:p>
+            <a:endParaRPr lang="en-GB" sz="3000" dirty="0"/>
+          </a:p>
+          <a:p>
+            <a:r>
+              <a:rPr lang="en-GB" sz="3200" dirty="0"/>
+              <a:t>It’s not clear who’s winning</a:t>
+            </a:r>
+          </a:p>
+          <a:p>
+            <a:r>
+              <a:rPr lang="en-GB" sz="3200" dirty="0"/>
+              <a:t>	</a:t>
+            </a:r>
+            <a:r>
+              <a:rPr lang="en-GB" sz="3000" dirty="0"/>
+              <a:t>Each player now has a couple to make happy</a:t>
+            </a:r>
+          </a:p>
+          <a:p>
+            <a:pPr>
+              <a:lnSpc>
+                <a:spcPct val="200000"/>
+              </a:lnSpc>
+            </a:pPr>
+            <a:endParaRPr lang="en-GB" sz="3200" dirty="0"/>
+          </a:p>
+          <a:p>
+            <a:pPr>
+              <a:lnSpc>
+                <a:spcPct val="200000"/>
+              </a:lnSpc>
+            </a:pPr>
+            <a:endParaRPr lang="en-GB" sz="3200" dirty="0"/>
+          </a:p>
+        </p:txBody>
+      </p:sp>
+    </p:spTree>
+    <p:extLst>
+      <p:ext uri="{BB962C8B-B14F-4D97-AF65-F5344CB8AC3E}">
+        <p14:creationId xmlns:p14="http://schemas.microsoft.com/office/powerpoint/2010/main" val="3653974548"/>
+      </p:ext>
+    </p:extLst>
+  </p:cSld>
+  <p:clrMapOvr>
+    <a:masterClrMapping/>
+  </p:clrMapOvr>
+</p:sld>
+</file>
+
+<file path=ppt/slides/slide12.xml><?xml version="1.0" encoding="utf-8"?>
+<p:sld xmlns:a="http://schemas.openxmlformats.org/drawingml/2006/main" xmlns:r="http://schemas.openxmlformats.org/officeDocument/2006/relationships" xmlns:p="http://schemas.openxmlformats.org/presentationml/2006/main">
+  <p:cSld>
+    <p:spTree>
+      <p:nvGrpSpPr>
+        <p:cNvPr id="1" name=""/>
+        <p:cNvGrpSpPr/>
+        <p:nvPr/>
+      </p:nvGrpSpPr>
+      <p:grpSpPr>
+        <a:xfrm>
+          <a:off x="0" y="0"/>
+          <a:ext cx="0" cy="0"/>
+          <a:chOff x="0" y="0"/>
+          <a:chExt cx="0" cy="0"/>
+        </a:xfrm>
+      </p:grpSpPr>
+      <p:sp>
+        <p:nvSpPr>
+          <p:cNvPr id="2" name="Title 1">
+            <a:extLst>
+              <a:ext uri="{FF2B5EF4-FFF2-40B4-BE49-F238E27FC236}">
+                <a16:creationId xmlns:a16="http://schemas.microsoft.com/office/drawing/2014/main" id="{AE8E65D8-2D40-4802-A039-397020ABC7CB}"/>
+              </a:ext>
+            </a:extLst>
+          </p:cNvPr>
+          <p:cNvSpPr>
+            <a:spLocks noGrp="1"/>
+          </p:cNvSpPr>
+          <p:nvPr>
+            <p:ph type="title"/>
+          </p:nvPr>
+        </p:nvSpPr>
+        <p:spPr>
+          <a:xfrm>
+            <a:off x="1251678" y="382385"/>
+            <a:ext cx="7472774" cy="1492132"/>
+          </a:xfrm>
+        </p:spPr>
+        <p:txBody>
+          <a:bodyPr>
+            <a:normAutofit/>
+          </a:bodyPr>
+          <a:lstStyle/>
+          <a:p>
+            <a:r>
+              <a:rPr lang="en-GB" dirty="0"/>
+              <a:t>What still needs to be done</a:t>
+            </a:r>
+          </a:p>
+        </p:txBody>
+      </p:sp>
+      <p:pic>
+        <p:nvPicPr>
+          <p:cNvPr id="8" name="Picture 7">
+            <a:extLst>
+              <a:ext uri="{FF2B5EF4-FFF2-40B4-BE49-F238E27FC236}">
+                <a16:creationId xmlns:a16="http://schemas.microsoft.com/office/drawing/2014/main" id="{97209A58-090E-434A-A100-3A1E314BED18}"/>
+              </a:ext>
+            </a:extLst>
+          </p:cNvPr>
+          <p:cNvPicPr>
+            <a:picLocks noChangeAspect="1"/>
+          </p:cNvPicPr>
+          <p:nvPr/>
+        </p:nvPicPr>
+        <p:blipFill>
+          <a:blip r:embed="rId3">
+            <a:extLst>
+              <a:ext uri="{28A0092B-C50C-407E-A947-70E740481C1C}">
+                <a14:useLocalDpi xmlns:a14="http://schemas.microsoft.com/office/drawing/2010/main" val="0"/>
+              </a:ext>
+            </a:extLst>
+          </a:blip>
+          <a:stretch>
+            <a:fillRect/>
+          </a:stretch>
+        </p:blipFill>
+        <p:spPr>
+          <a:xfrm>
+            <a:off x="10499835" y="197250"/>
+            <a:ext cx="1082563" cy="1198414"/>
+          </a:xfrm>
+          <a:prstGeom prst="rect">
+            <a:avLst/>
+          </a:prstGeom>
+        </p:spPr>
+      </p:pic>
+      <p:sp>
+        <p:nvSpPr>
+          <p:cNvPr id="9" name="TextBox 8">
+            <a:extLst>
+              <a:ext uri="{FF2B5EF4-FFF2-40B4-BE49-F238E27FC236}">
+                <a16:creationId xmlns:a16="http://schemas.microsoft.com/office/drawing/2014/main" id="{9CFFBA23-97CE-4987-AA89-6173A4CE55EE}"/>
+              </a:ext>
+            </a:extLst>
+          </p:cNvPr>
+          <p:cNvSpPr txBox="1"/>
+          <p:nvPr/>
+        </p:nvSpPr>
+        <p:spPr>
+          <a:xfrm>
+            <a:off x="1628382" y="1874517"/>
+            <a:ext cx="7644705" cy="4314386"/>
+          </a:xfrm>
+          <a:prstGeom prst="rect">
+            <a:avLst/>
+          </a:prstGeom>
+          <a:noFill/>
+        </p:spPr>
+        <p:txBody>
+          <a:bodyPr wrap="square" rtlCol="0">
+            <a:spAutoFit/>
+          </a:bodyPr>
+          <a:lstStyle/>
+          <a:p>
+            <a:r>
+              <a:rPr lang="en-GB" sz="3200" dirty="0"/>
+              <a:t>Results screen to be finished</a:t>
+            </a:r>
+          </a:p>
+          <a:p>
+            <a:endParaRPr lang="en-GB" sz="3000" dirty="0"/>
+          </a:p>
+          <a:p>
+            <a:r>
+              <a:rPr lang="en-GB" sz="3200" dirty="0"/>
+              <a:t>Couple screens need to be added in</a:t>
+            </a:r>
+          </a:p>
+          <a:p>
+            <a:endParaRPr lang="en-GB" sz="3000" dirty="0"/>
+          </a:p>
+          <a:p>
+            <a:r>
+              <a:rPr lang="en-GB" sz="3200" dirty="0"/>
+              <a:t>Polish!</a:t>
+            </a:r>
+          </a:p>
+          <a:p>
+            <a:pPr>
+              <a:lnSpc>
+                <a:spcPct val="200000"/>
+              </a:lnSpc>
+            </a:pPr>
+            <a:endParaRPr lang="en-GB" sz="3200" dirty="0"/>
+          </a:p>
+          <a:p>
+            <a:pPr>
+              <a:lnSpc>
+                <a:spcPct val="200000"/>
+              </a:lnSpc>
+            </a:pPr>
+            <a:endParaRPr lang="en-GB" sz="3200" dirty="0"/>
+          </a:p>
+        </p:txBody>
+      </p:sp>
+    </p:spTree>
+    <p:extLst>
+      <p:ext uri="{BB962C8B-B14F-4D97-AF65-F5344CB8AC3E}">
+        <p14:creationId xmlns:p14="http://schemas.microsoft.com/office/powerpoint/2010/main" val="2812298778"/>
+      </p:ext>
+    </p:extLst>
+  </p:cSld>
+  <p:clrMapOvr>
+    <a:masterClrMapping/>
+  </p:clrMapOvr>
+</p:sld>
+</file>
+
+<file path=ppt/slides/slide13.xml><?xml version="1.0" encoding="utf-8"?>
+<p:sld xmlns:a="http://schemas.openxmlformats.org/drawingml/2006/main" xmlns:r="http://schemas.openxmlformats.org/officeDocument/2006/relationships" xmlns:p="http://schemas.openxmlformats.org/presentationml/2006/main">
+  <p:cSld>
+    <p:spTree>
+      <p:nvGrpSpPr>
+        <p:cNvPr id="1" name=""/>
+        <p:cNvGrpSpPr/>
+        <p:nvPr/>
+      </p:nvGrpSpPr>
+      <p:grpSpPr>
+        <a:xfrm>
+          <a:off x="0" y="0"/>
+          <a:ext cx="0" cy="0"/>
+          <a:chOff x="0" y="0"/>
+          <a:chExt cx="0" cy="0"/>
+        </a:xfrm>
+      </p:grpSpPr>
+      <p:sp>
+        <p:nvSpPr>
+          <p:cNvPr id="2" name="Title 1">
+            <a:extLst>
+              <a:ext uri="{FF2B5EF4-FFF2-40B4-BE49-F238E27FC236}">
+                <a16:creationId xmlns:a16="http://schemas.microsoft.com/office/drawing/2014/main" id="{3D6CF4C6-C2E2-492B-AA01-DE44F14B9D46}"/>
+              </a:ext>
+            </a:extLst>
+          </p:cNvPr>
+          <p:cNvSpPr>
+            <a:spLocks noGrp="1"/>
+          </p:cNvSpPr>
+          <p:nvPr>
+            <p:ph type="title"/>
+          </p:nvPr>
+        </p:nvSpPr>
+        <p:spPr>
+          <a:xfrm>
+            <a:off x="2148207" y="3082554"/>
+            <a:ext cx="8107475" cy="1492132"/>
+          </a:xfrm>
+        </p:spPr>
+        <p:txBody>
+          <a:bodyPr/>
+          <a:lstStyle/>
+          <a:p>
+            <a:pPr algn="ctr"/>
+            <a:r>
+              <a:rPr lang="en-GB" dirty="0"/>
+              <a:t>Any Questions?</a:t>
+            </a:r>
+          </a:p>
+        </p:txBody>
+      </p:sp>
+    </p:spTree>
+    <p:extLst>
+      <p:ext uri="{BB962C8B-B14F-4D97-AF65-F5344CB8AC3E}">
+        <p14:creationId xmlns:p14="http://schemas.microsoft.com/office/powerpoint/2010/main" val="2641661231"/>
+      </p:ext>
+    </p:extLst>
+  </p:cSld>
+  <p:clrMapOvr>
+    <a:masterClrMapping/>
+  </p:clrMapOvr>
+</p:sld>
+</file>
+
 <file path=ppt/slides/slide2.xml><?xml version="1.0" encoding="utf-8"?>
 <p:sld xmlns:a="http://schemas.openxmlformats.org/drawingml/2006/main" xmlns:r="http://schemas.openxmlformats.org/officeDocument/2006/relationships" xmlns:p="http://schemas.openxmlformats.org/presentationml/2006/main">
   <p:cSld>
@@ -7934,7 +9076,7 @@
           <a:p>
             <a:r>
               <a:rPr lang="en-GB" dirty="0"/>
-              <a:t>Core mechanics </a:t>
+              <a:t>Our Game</a:t>
             </a:r>
           </a:p>
         </p:txBody>
@@ -8720,7 +9862,7 @@
           <p:cNvPr id="2" name="Title 1">
             <a:extLst>
               <a:ext uri="{FF2B5EF4-FFF2-40B4-BE49-F238E27FC236}">
-                <a16:creationId xmlns:a16="http://schemas.microsoft.com/office/drawing/2014/main" id="{3D6CF4C6-C2E2-492B-AA01-DE44F14B9D46}"/>
+                <a16:creationId xmlns:a16="http://schemas.microsoft.com/office/drawing/2014/main" id="{AE8E65D8-2D40-4802-A039-397020ABC7CB}"/>
               </a:ext>
             </a:extLst>
           </p:cNvPr>
@@ -8733,26 +9875,493 @@
         </p:nvSpPr>
         <p:spPr>
           <a:xfrm>
-            <a:off x="2148207" y="3082554"/>
-            <a:ext cx="8107475" cy="1492132"/>
+            <a:off x="1251678" y="382385"/>
+            <a:ext cx="7472774" cy="1492132"/>
           </a:xfrm>
         </p:spPr>
         <p:txBody>
-          <a:bodyPr/>
+          <a:bodyPr>
+            <a:normAutofit/>
+          </a:bodyPr>
           <a:lstStyle/>
           <a:p>
-            <a:pPr algn="ctr"/>
             <a:r>
               <a:rPr lang="en-GB" dirty="0"/>
-              <a:t>Any Questions?</a:t>
-            </a:r>
+              <a:t>Current </a:t>
+            </a:r>
+            <a:r>
+              <a:rPr lang="en-GB" dirty="0" err="1"/>
+              <a:t>FeedBack</a:t>
+            </a:r>
+            <a:endParaRPr lang="en-GB" dirty="0"/>
+          </a:p>
+        </p:txBody>
+      </p:sp>
+      <p:pic>
+        <p:nvPicPr>
+          <p:cNvPr id="8" name="Picture 7">
+            <a:extLst>
+              <a:ext uri="{FF2B5EF4-FFF2-40B4-BE49-F238E27FC236}">
+                <a16:creationId xmlns:a16="http://schemas.microsoft.com/office/drawing/2014/main" id="{97209A58-090E-434A-A100-3A1E314BED18}"/>
+              </a:ext>
+            </a:extLst>
+          </p:cNvPr>
+          <p:cNvPicPr>
+            <a:picLocks noChangeAspect="1"/>
+          </p:cNvPicPr>
+          <p:nvPr/>
+        </p:nvPicPr>
+        <p:blipFill>
+          <a:blip r:embed="rId3">
+            <a:extLst>
+              <a:ext uri="{28A0092B-C50C-407E-A947-70E740481C1C}">
+                <a14:useLocalDpi xmlns:a14="http://schemas.microsoft.com/office/drawing/2010/main" val="0"/>
+              </a:ext>
+            </a:extLst>
+          </a:blip>
+          <a:stretch>
+            <a:fillRect/>
+          </a:stretch>
+        </p:blipFill>
+        <p:spPr>
+          <a:xfrm>
+            <a:off x="10499835" y="197250"/>
+            <a:ext cx="1082563" cy="1198414"/>
+          </a:xfrm>
+          <a:prstGeom prst="rect">
+            <a:avLst/>
+          </a:prstGeom>
+        </p:spPr>
+      </p:pic>
+      <p:sp>
+        <p:nvSpPr>
+          <p:cNvPr id="9" name="TextBox 8">
+            <a:extLst>
+              <a:ext uri="{FF2B5EF4-FFF2-40B4-BE49-F238E27FC236}">
+                <a16:creationId xmlns:a16="http://schemas.microsoft.com/office/drawing/2014/main" id="{9CFFBA23-97CE-4987-AA89-6173A4CE55EE}"/>
+              </a:ext>
+            </a:extLst>
+          </p:cNvPr>
+          <p:cNvSpPr txBox="1"/>
+          <p:nvPr/>
+        </p:nvSpPr>
+        <p:spPr>
+          <a:xfrm>
+            <a:off x="1628382" y="1874517"/>
+            <a:ext cx="7644705" cy="4314386"/>
+          </a:xfrm>
+          <a:prstGeom prst="rect">
+            <a:avLst/>
+          </a:prstGeom>
+          <a:noFill/>
+        </p:spPr>
+        <p:txBody>
+          <a:bodyPr wrap="square" rtlCol="0">
+            <a:spAutoFit/>
+          </a:bodyPr>
+          <a:lstStyle/>
+          <a:p>
+            <a:r>
+              <a:rPr lang="en-GB" sz="3200" dirty="0"/>
+              <a:t>Its too easy</a:t>
+            </a:r>
+          </a:p>
+          <a:p>
+            <a:endParaRPr lang="en-GB" sz="3000" dirty="0"/>
+          </a:p>
+          <a:p>
+            <a:r>
+              <a:rPr lang="en-GB" sz="3200" dirty="0"/>
+              <a:t>Player 2 can’t read the recipe</a:t>
+            </a:r>
+          </a:p>
+          <a:p>
+            <a:endParaRPr lang="en-GB" sz="3000" dirty="0"/>
+          </a:p>
+          <a:p>
+            <a:r>
+              <a:rPr lang="en-GB" sz="3200" dirty="0"/>
+              <a:t>It’s not clear who’s winning</a:t>
+            </a:r>
+          </a:p>
+          <a:p>
+            <a:pPr>
+              <a:lnSpc>
+                <a:spcPct val="200000"/>
+              </a:lnSpc>
+            </a:pPr>
+            <a:endParaRPr lang="en-GB" sz="3200" dirty="0"/>
+          </a:p>
+          <a:p>
+            <a:pPr>
+              <a:lnSpc>
+                <a:spcPct val="200000"/>
+              </a:lnSpc>
+            </a:pPr>
+            <a:endParaRPr lang="en-GB" sz="3200" dirty="0"/>
           </a:p>
         </p:txBody>
       </p:sp>
     </p:spTree>
     <p:extLst>
       <p:ext uri="{BB962C8B-B14F-4D97-AF65-F5344CB8AC3E}">
-        <p14:creationId xmlns:p14="http://schemas.microsoft.com/office/powerpoint/2010/main" val="2641661231"/>
+        <p14:creationId xmlns:p14="http://schemas.microsoft.com/office/powerpoint/2010/main" val="3390853099"/>
+      </p:ext>
+    </p:extLst>
+  </p:cSld>
+  <p:clrMapOvr>
+    <a:masterClrMapping/>
+  </p:clrMapOvr>
+</p:sld>
+</file>
+
+<file path=ppt/slides/slide8.xml><?xml version="1.0" encoding="utf-8"?>
+<p:sld xmlns:a="http://schemas.openxmlformats.org/drawingml/2006/main" xmlns:r="http://schemas.openxmlformats.org/officeDocument/2006/relationships" xmlns:p="http://schemas.openxmlformats.org/presentationml/2006/main">
+  <p:cSld>
+    <p:spTree>
+      <p:nvGrpSpPr>
+        <p:cNvPr id="1" name=""/>
+        <p:cNvGrpSpPr/>
+        <p:nvPr/>
+      </p:nvGrpSpPr>
+      <p:grpSpPr>
+        <a:xfrm>
+          <a:off x="0" y="0"/>
+          <a:ext cx="0" cy="0"/>
+          <a:chOff x="0" y="0"/>
+          <a:chExt cx="0" cy="0"/>
+        </a:xfrm>
+      </p:grpSpPr>
+      <p:sp>
+        <p:nvSpPr>
+          <p:cNvPr id="2" name="Title 1">
+            <a:extLst>
+              <a:ext uri="{FF2B5EF4-FFF2-40B4-BE49-F238E27FC236}">
+                <a16:creationId xmlns:a16="http://schemas.microsoft.com/office/drawing/2014/main" id="{AE8E65D8-2D40-4802-A039-397020ABC7CB}"/>
+              </a:ext>
+            </a:extLst>
+          </p:cNvPr>
+          <p:cNvSpPr>
+            <a:spLocks noGrp="1"/>
+          </p:cNvSpPr>
+          <p:nvPr>
+            <p:ph type="title"/>
+          </p:nvPr>
+        </p:nvSpPr>
+        <p:spPr>
+          <a:xfrm>
+            <a:off x="1251678" y="382385"/>
+            <a:ext cx="7472774" cy="1492132"/>
+          </a:xfrm>
+        </p:spPr>
+        <p:txBody>
+          <a:bodyPr>
+            <a:normAutofit/>
+          </a:bodyPr>
+          <a:lstStyle/>
+          <a:p>
+            <a:r>
+              <a:rPr lang="en-GB" dirty="0"/>
+              <a:t>Current </a:t>
+            </a:r>
+            <a:r>
+              <a:rPr lang="en-GB" dirty="0" err="1"/>
+              <a:t>FeedBack</a:t>
+            </a:r>
+            <a:endParaRPr lang="en-GB" dirty="0"/>
+          </a:p>
+        </p:txBody>
+      </p:sp>
+      <p:pic>
+        <p:nvPicPr>
+          <p:cNvPr id="8" name="Picture 7">
+            <a:extLst>
+              <a:ext uri="{FF2B5EF4-FFF2-40B4-BE49-F238E27FC236}">
+                <a16:creationId xmlns:a16="http://schemas.microsoft.com/office/drawing/2014/main" id="{97209A58-090E-434A-A100-3A1E314BED18}"/>
+              </a:ext>
+            </a:extLst>
+          </p:cNvPr>
+          <p:cNvPicPr>
+            <a:picLocks noChangeAspect="1"/>
+          </p:cNvPicPr>
+          <p:nvPr/>
+        </p:nvPicPr>
+        <p:blipFill>
+          <a:blip r:embed="rId3">
+            <a:extLst>
+              <a:ext uri="{28A0092B-C50C-407E-A947-70E740481C1C}">
+                <a14:useLocalDpi xmlns:a14="http://schemas.microsoft.com/office/drawing/2010/main" val="0"/>
+              </a:ext>
+            </a:extLst>
+          </a:blip>
+          <a:stretch>
+            <a:fillRect/>
+          </a:stretch>
+        </p:blipFill>
+        <p:spPr>
+          <a:xfrm>
+            <a:off x="10499835" y="197250"/>
+            <a:ext cx="1082563" cy="1198414"/>
+          </a:xfrm>
+          <a:prstGeom prst="rect">
+            <a:avLst/>
+          </a:prstGeom>
+        </p:spPr>
+      </p:pic>
+      <p:sp>
+        <p:nvSpPr>
+          <p:cNvPr id="9" name="TextBox 8">
+            <a:extLst>
+              <a:ext uri="{FF2B5EF4-FFF2-40B4-BE49-F238E27FC236}">
+                <a16:creationId xmlns:a16="http://schemas.microsoft.com/office/drawing/2014/main" id="{9CFFBA23-97CE-4987-AA89-6173A4CE55EE}"/>
+              </a:ext>
+            </a:extLst>
+          </p:cNvPr>
+          <p:cNvSpPr txBox="1"/>
+          <p:nvPr/>
+        </p:nvSpPr>
+        <p:spPr>
+          <a:xfrm>
+            <a:off x="1628382" y="1874517"/>
+            <a:ext cx="7644705" cy="4314386"/>
+          </a:xfrm>
+          <a:prstGeom prst="rect">
+            <a:avLst/>
+          </a:prstGeom>
+          <a:noFill/>
+        </p:spPr>
+        <p:txBody>
+          <a:bodyPr wrap="square" rtlCol="0">
+            <a:spAutoFit/>
+          </a:bodyPr>
+          <a:lstStyle/>
+          <a:p>
+            <a:r>
+              <a:rPr lang="en-GB" sz="3200" dirty="0"/>
+              <a:t>Its too easy</a:t>
+            </a:r>
+          </a:p>
+          <a:p>
+            <a:endParaRPr lang="en-GB" sz="3000" dirty="0"/>
+          </a:p>
+          <a:p>
+            <a:r>
+              <a:rPr lang="en-GB" sz="3200" dirty="0"/>
+              <a:t>Player 2 can’t read the recipe</a:t>
+            </a:r>
+          </a:p>
+          <a:p>
+            <a:endParaRPr lang="en-GB" sz="3000" dirty="0"/>
+          </a:p>
+          <a:p>
+            <a:r>
+              <a:rPr lang="en-GB" sz="3200" dirty="0"/>
+              <a:t>It’s not clear who’s winning</a:t>
+            </a:r>
+          </a:p>
+          <a:p>
+            <a:pPr>
+              <a:lnSpc>
+                <a:spcPct val="200000"/>
+              </a:lnSpc>
+            </a:pPr>
+            <a:endParaRPr lang="en-GB" sz="3200" dirty="0"/>
+          </a:p>
+          <a:p>
+            <a:pPr>
+              <a:lnSpc>
+                <a:spcPct val="200000"/>
+              </a:lnSpc>
+            </a:pPr>
+            <a:endParaRPr lang="en-GB" sz="3200" dirty="0"/>
+          </a:p>
+        </p:txBody>
+      </p:sp>
+    </p:spTree>
+    <p:extLst>
+      <p:ext uri="{BB962C8B-B14F-4D97-AF65-F5344CB8AC3E}">
+        <p14:creationId xmlns:p14="http://schemas.microsoft.com/office/powerpoint/2010/main" val="3051860570"/>
+      </p:ext>
+    </p:extLst>
+  </p:cSld>
+  <p:clrMapOvr>
+    <a:masterClrMapping/>
+  </p:clrMapOvr>
+</p:sld>
+</file>
+
+<file path=ppt/slides/slide9.xml><?xml version="1.0" encoding="utf-8"?>
+<p:sld xmlns:a="http://schemas.openxmlformats.org/drawingml/2006/main" xmlns:r="http://schemas.openxmlformats.org/officeDocument/2006/relationships" xmlns:p="http://schemas.openxmlformats.org/presentationml/2006/main">
+  <p:cSld>
+    <p:spTree>
+      <p:nvGrpSpPr>
+        <p:cNvPr id="1" name=""/>
+        <p:cNvGrpSpPr/>
+        <p:nvPr/>
+      </p:nvGrpSpPr>
+      <p:grpSpPr>
+        <a:xfrm>
+          <a:off x="0" y="0"/>
+          <a:ext cx="0" cy="0"/>
+          <a:chOff x="0" y="0"/>
+          <a:chExt cx="0" cy="0"/>
+        </a:xfrm>
+      </p:grpSpPr>
+      <p:sp>
+        <p:nvSpPr>
+          <p:cNvPr id="2" name="Title 1">
+            <a:extLst>
+              <a:ext uri="{FF2B5EF4-FFF2-40B4-BE49-F238E27FC236}">
+                <a16:creationId xmlns:a16="http://schemas.microsoft.com/office/drawing/2014/main" id="{AE8E65D8-2D40-4802-A039-397020ABC7CB}"/>
+              </a:ext>
+            </a:extLst>
+          </p:cNvPr>
+          <p:cNvSpPr>
+            <a:spLocks noGrp="1"/>
+          </p:cNvSpPr>
+          <p:nvPr>
+            <p:ph type="title"/>
+          </p:nvPr>
+        </p:nvSpPr>
+        <p:spPr>
+          <a:xfrm>
+            <a:off x="1251678" y="382385"/>
+            <a:ext cx="7472774" cy="1492132"/>
+          </a:xfrm>
+        </p:spPr>
+        <p:txBody>
+          <a:bodyPr>
+            <a:normAutofit/>
+          </a:bodyPr>
+          <a:lstStyle/>
+          <a:p>
+            <a:r>
+              <a:rPr lang="en-GB" dirty="0"/>
+              <a:t>Current </a:t>
+            </a:r>
+            <a:r>
+              <a:rPr lang="en-GB" dirty="0" err="1"/>
+              <a:t>FeedBack</a:t>
+            </a:r>
+            <a:endParaRPr lang="en-GB" dirty="0"/>
+          </a:p>
+        </p:txBody>
+      </p:sp>
+      <p:pic>
+        <p:nvPicPr>
+          <p:cNvPr id="8" name="Picture 7">
+            <a:extLst>
+              <a:ext uri="{FF2B5EF4-FFF2-40B4-BE49-F238E27FC236}">
+                <a16:creationId xmlns:a16="http://schemas.microsoft.com/office/drawing/2014/main" id="{97209A58-090E-434A-A100-3A1E314BED18}"/>
+              </a:ext>
+            </a:extLst>
+          </p:cNvPr>
+          <p:cNvPicPr>
+            <a:picLocks noChangeAspect="1"/>
+          </p:cNvPicPr>
+          <p:nvPr/>
+        </p:nvPicPr>
+        <p:blipFill>
+          <a:blip r:embed="rId3">
+            <a:extLst>
+              <a:ext uri="{28A0092B-C50C-407E-A947-70E740481C1C}">
+                <a14:useLocalDpi xmlns:a14="http://schemas.microsoft.com/office/drawing/2010/main" val="0"/>
+              </a:ext>
+            </a:extLst>
+          </a:blip>
+          <a:stretch>
+            <a:fillRect/>
+          </a:stretch>
+        </p:blipFill>
+        <p:spPr>
+          <a:xfrm>
+            <a:off x="10499835" y="197250"/>
+            <a:ext cx="1082563" cy="1198414"/>
+          </a:xfrm>
+          <a:prstGeom prst="rect">
+            <a:avLst/>
+          </a:prstGeom>
+        </p:spPr>
+      </p:pic>
+      <p:sp>
+        <p:nvSpPr>
+          <p:cNvPr id="9" name="TextBox 8">
+            <a:extLst>
+              <a:ext uri="{FF2B5EF4-FFF2-40B4-BE49-F238E27FC236}">
+                <a16:creationId xmlns:a16="http://schemas.microsoft.com/office/drawing/2014/main" id="{9CFFBA23-97CE-4987-AA89-6173A4CE55EE}"/>
+              </a:ext>
+            </a:extLst>
+          </p:cNvPr>
+          <p:cNvSpPr txBox="1"/>
+          <p:nvPr/>
+        </p:nvSpPr>
+        <p:spPr>
+          <a:xfrm>
+            <a:off x="1628382" y="1874517"/>
+            <a:ext cx="7644705" cy="4776051"/>
+          </a:xfrm>
+          <a:prstGeom prst="rect">
+            <a:avLst/>
+          </a:prstGeom>
+          <a:noFill/>
+        </p:spPr>
+        <p:txBody>
+          <a:bodyPr wrap="square" rtlCol="0">
+            <a:spAutoFit/>
+          </a:bodyPr>
+          <a:lstStyle/>
+          <a:p>
+            <a:r>
+              <a:rPr lang="en-GB" sz="3200" dirty="0"/>
+              <a:t>Its too easy</a:t>
+            </a:r>
+          </a:p>
+          <a:p>
+            <a:r>
+              <a:rPr lang="en-GB" sz="3000" dirty="0"/>
+              <a:t>	We added a red herring</a:t>
+            </a:r>
+          </a:p>
+          <a:p>
+            <a:endParaRPr lang="en-GB" sz="3000" dirty="0"/>
+          </a:p>
+          <a:p>
+            <a:r>
+              <a:rPr lang="en-GB" sz="3200" dirty="0"/>
+              <a:t>Player 2 can’t read the recipe</a:t>
+            </a:r>
+          </a:p>
+          <a:p>
+            <a:endParaRPr lang="en-GB" sz="3000" dirty="0"/>
+          </a:p>
+          <a:p>
+            <a:r>
+              <a:rPr lang="en-GB" sz="3200" dirty="0"/>
+              <a:t>It’s not clear who’s winning</a:t>
+            </a:r>
+          </a:p>
+          <a:p>
+            <a:pPr>
+              <a:lnSpc>
+                <a:spcPct val="200000"/>
+              </a:lnSpc>
+            </a:pPr>
+            <a:endParaRPr lang="en-GB" sz="3200" dirty="0"/>
+          </a:p>
+          <a:p>
+            <a:pPr>
+              <a:lnSpc>
+                <a:spcPct val="200000"/>
+              </a:lnSpc>
+            </a:pPr>
+            <a:endParaRPr lang="en-GB" sz="3200" dirty="0"/>
+          </a:p>
+        </p:txBody>
+      </p:sp>
+    </p:spTree>
+    <p:extLst>
+      <p:ext uri="{BB962C8B-B14F-4D97-AF65-F5344CB8AC3E}">
+        <p14:creationId xmlns:p14="http://schemas.microsoft.com/office/powerpoint/2010/main" val="1346076343"/>
       </p:ext>
     </p:extLst>
   </p:cSld>

</xml_diff>